<commit_message>
Initial Upload of IM Lab
</commit_message>
<xml_diff>
--- a/dbcs-inmem/WorkshopHeader.pptx
+++ b/dbcs-inmem/WorkshopHeader.pptx
@@ -238,7 +238,8 @@
           <a:p>
             <a:fld id="{BED1614E-28FD-C54C-811F-CB4EE2076F62}" type="datetimeFigureOut">
               <a:rPr lang="en-US" smtClean="0"/>
-              <a:t>1/27/17</a:t>
+              <a:pPr/>
+              <a:t>4/10/2017</a:t>
             </a:fld>
             <a:endParaRPr lang="en-US"/>
           </a:p>
@@ -280,6 +281,7 @@
           <a:p>
             <a:fld id="{20AE39AD-C2FA-A54F-A200-EE4A7E7B5C00}" type="slidenum">
               <a:rPr lang="en-US" smtClean="0"/>
+              <a:pPr/>
               <a:t>‹#›</a:t>
             </a:fld>
             <a:endParaRPr lang="en-US"/>
@@ -289,7 +291,7 @@
     </p:spTree>
     <p:extLst>
       <p:ext uri="{BB962C8B-B14F-4D97-AF65-F5344CB8AC3E}">
-        <p14:creationId xmlns:p14="http://schemas.microsoft.com/office/powerpoint/2010/main" val="1861031596"/>
+        <p14:creationId xmlns:p14="http://schemas.microsoft.com/office/powerpoint/2010/main" xmlns="" val="1861031596"/>
       </p:ext>
     </p:extLst>
   </p:cSld>
@@ -408,7 +410,8 @@
           <a:p>
             <a:fld id="{BED1614E-28FD-C54C-811F-CB4EE2076F62}" type="datetimeFigureOut">
               <a:rPr lang="en-US" smtClean="0"/>
-              <a:t>1/27/17</a:t>
+              <a:pPr/>
+              <a:t>4/10/2017</a:t>
             </a:fld>
             <a:endParaRPr lang="en-US"/>
           </a:p>
@@ -450,6 +453,7 @@
           <a:p>
             <a:fld id="{20AE39AD-C2FA-A54F-A200-EE4A7E7B5C00}" type="slidenum">
               <a:rPr lang="en-US" smtClean="0"/>
+              <a:pPr/>
               <a:t>‹#›</a:t>
             </a:fld>
             <a:endParaRPr lang="en-US"/>
@@ -459,7 +463,7 @@
     </p:spTree>
     <p:extLst>
       <p:ext uri="{BB962C8B-B14F-4D97-AF65-F5344CB8AC3E}">
-        <p14:creationId xmlns:p14="http://schemas.microsoft.com/office/powerpoint/2010/main" val="668241230"/>
+        <p14:creationId xmlns:p14="http://schemas.microsoft.com/office/powerpoint/2010/main" xmlns="" val="668241230"/>
       </p:ext>
     </p:extLst>
   </p:cSld>
@@ -588,7 +592,8 @@
           <a:p>
             <a:fld id="{BED1614E-28FD-C54C-811F-CB4EE2076F62}" type="datetimeFigureOut">
               <a:rPr lang="en-US" smtClean="0"/>
-              <a:t>1/27/17</a:t>
+              <a:pPr/>
+              <a:t>4/10/2017</a:t>
             </a:fld>
             <a:endParaRPr lang="en-US"/>
           </a:p>
@@ -630,6 +635,7 @@
           <a:p>
             <a:fld id="{20AE39AD-C2FA-A54F-A200-EE4A7E7B5C00}" type="slidenum">
               <a:rPr lang="en-US" smtClean="0"/>
+              <a:pPr/>
               <a:t>‹#›</a:t>
             </a:fld>
             <a:endParaRPr lang="en-US"/>
@@ -639,7 +645,7 @@
     </p:spTree>
     <p:extLst>
       <p:ext uri="{BB962C8B-B14F-4D97-AF65-F5344CB8AC3E}">
-        <p14:creationId xmlns:p14="http://schemas.microsoft.com/office/powerpoint/2010/main" val="1938362447"/>
+        <p14:creationId xmlns:p14="http://schemas.microsoft.com/office/powerpoint/2010/main" xmlns="" val="1938362447"/>
       </p:ext>
     </p:extLst>
   </p:cSld>
@@ -758,7 +764,8 @@
           <a:p>
             <a:fld id="{BED1614E-28FD-C54C-811F-CB4EE2076F62}" type="datetimeFigureOut">
               <a:rPr lang="en-US" smtClean="0"/>
-              <a:t>1/27/17</a:t>
+              <a:pPr/>
+              <a:t>4/10/2017</a:t>
             </a:fld>
             <a:endParaRPr lang="en-US"/>
           </a:p>
@@ -800,6 +807,7 @@
           <a:p>
             <a:fld id="{20AE39AD-C2FA-A54F-A200-EE4A7E7B5C00}" type="slidenum">
               <a:rPr lang="en-US" smtClean="0"/>
+              <a:pPr/>
               <a:t>‹#›</a:t>
             </a:fld>
             <a:endParaRPr lang="en-US"/>
@@ -809,7 +817,7 @@
     </p:spTree>
     <p:extLst>
       <p:ext uri="{BB962C8B-B14F-4D97-AF65-F5344CB8AC3E}">
-        <p14:creationId xmlns:p14="http://schemas.microsoft.com/office/powerpoint/2010/main" val="258715417"/>
+        <p14:creationId xmlns:p14="http://schemas.microsoft.com/office/powerpoint/2010/main" xmlns="" val="258715417"/>
       </p:ext>
     </p:extLst>
   </p:cSld>
@@ -1004,7 +1012,8 @@
           <a:p>
             <a:fld id="{BED1614E-28FD-C54C-811F-CB4EE2076F62}" type="datetimeFigureOut">
               <a:rPr lang="en-US" smtClean="0"/>
-              <a:t>1/27/17</a:t>
+              <a:pPr/>
+              <a:t>4/10/2017</a:t>
             </a:fld>
             <a:endParaRPr lang="en-US"/>
           </a:p>
@@ -1046,6 +1055,7 @@
           <a:p>
             <a:fld id="{20AE39AD-C2FA-A54F-A200-EE4A7E7B5C00}" type="slidenum">
               <a:rPr lang="en-US" smtClean="0"/>
+              <a:pPr/>
               <a:t>‹#›</a:t>
             </a:fld>
             <a:endParaRPr lang="en-US"/>
@@ -1055,7 +1065,7 @@
     </p:spTree>
     <p:extLst>
       <p:ext uri="{BB962C8B-B14F-4D97-AF65-F5344CB8AC3E}">
-        <p14:creationId xmlns:p14="http://schemas.microsoft.com/office/powerpoint/2010/main" val="1723111991"/>
+        <p14:creationId xmlns:p14="http://schemas.microsoft.com/office/powerpoint/2010/main" xmlns="" val="1723111991"/>
       </p:ext>
     </p:extLst>
   </p:cSld>
@@ -1236,7 +1246,8 @@
           <a:p>
             <a:fld id="{BED1614E-28FD-C54C-811F-CB4EE2076F62}" type="datetimeFigureOut">
               <a:rPr lang="en-US" smtClean="0"/>
-              <a:t>1/27/17</a:t>
+              <a:pPr/>
+              <a:t>4/10/2017</a:t>
             </a:fld>
             <a:endParaRPr lang="en-US"/>
           </a:p>
@@ -1278,6 +1289,7 @@
           <a:p>
             <a:fld id="{20AE39AD-C2FA-A54F-A200-EE4A7E7B5C00}" type="slidenum">
               <a:rPr lang="en-US" smtClean="0"/>
+              <a:pPr/>
               <a:t>‹#›</a:t>
             </a:fld>
             <a:endParaRPr lang="en-US"/>
@@ -1287,7 +1299,7 @@
     </p:spTree>
     <p:extLst>
       <p:ext uri="{BB962C8B-B14F-4D97-AF65-F5344CB8AC3E}">
-        <p14:creationId xmlns:p14="http://schemas.microsoft.com/office/powerpoint/2010/main" val="1526252942"/>
+        <p14:creationId xmlns:p14="http://schemas.microsoft.com/office/powerpoint/2010/main" xmlns="" val="1526252942"/>
       </p:ext>
     </p:extLst>
   </p:cSld>
@@ -1603,7 +1615,8 @@
           <a:p>
             <a:fld id="{BED1614E-28FD-C54C-811F-CB4EE2076F62}" type="datetimeFigureOut">
               <a:rPr lang="en-US" smtClean="0"/>
-              <a:t>1/27/17</a:t>
+              <a:pPr/>
+              <a:t>4/10/2017</a:t>
             </a:fld>
             <a:endParaRPr lang="en-US"/>
           </a:p>
@@ -1645,6 +1658,7 @@
           <a:p>
             <a:fld id="{20AE39AD-C2FA-A54F-A200-EE4A7E7B5C00}" type="slidenum">
               <a:rPr lang="en-US" smtClean="0"/>
+              <a:pPr/>
               <a:t>‹#›</a:t>
             </a:fld>
             <a:endParaRPr lang="en-US"/>
@@ -1654,7 +1668,7 @@
     </p:spTree>
     <p:extLst>
       <p:ext uri="{BB962C8B-B14F-4D97-AF65-F5344CB8AC3E}">
-        <p14:creationId xmlns:p14="http://schemas.microsoft.com/office/powerpoint/2010/main" val="41032779"/>
+        <p14:creationId xmlns:p14="http://schemas.microsoft.com/office/powerpoint/2010/main" xmlns="" val="41032779"/>
       </p:ext>
     </p:extLst>
   </p:cSld>
@@ -1721,7 +1735,8 @@
           <a:p>
             <a:fld id="{BED1614E-28FD-C54C-811F-CB4EE2076F62}" type="datetimeFigureOut">
               <a:rPr lang="en-US" smtClean="0"/>
-              <a:t>1/27/17</a:t>
+              <a:pPr/>
+              <a:t>4/10/2017</a:t>
             </a:fld>
             <a:endParaRPr lang="en-US"/>
           </a:p>
@@ -1763,6 +1778,7 @@
           <a:p>
             <a:fld id="{20AE39AD-C2FA-A54F-A200-EE4A7E7B5C00}" type="slidenum">
               <a:rPr lang="en-US" smtClean="0"/>
+              <a:pPr/>
               <a:t>‹#›</a:t>
             </a:fld>
             <a:endParaRPr lang="en-US"/>
@@ -1772,7 +1788,7 @@
     </p:spTree>
     <p:extLst>
       <p:ext uri="{BB962C8B-B14F-4D97-AF65-F5344CB8AC3E}">
-        <p14:creationId xmlns:p14="http://schemas.microsoft.com/office/powerpoint/2010/main" val="295665966"/>
+        <p14:creationId xmlns:p14="http://schemas.microsoft.com/office/powerpoint/2010/main" xmlns="" val="295665966"/>
       </p:ext>
     </p:extLst>
   </p:cSld>
@@ -1816,7 +1832,8 @@
           <a:p>
             <a:fld id="{BED1614E-28FD-C54C-811F-CB4EE2076F62}" type="datetimeFigureOut">
               <a:rPr lang="en-US" smtClean="0"/>
-              <a:t>1/27/17</a:t>
+              <a:pPr/>
+              <a:t>4/10/2017</a:t>
             </a:fld>
             <a:endParaRPr lang="en-US"/>
           </a:p>
@@ -1858,6 +1875,7 @@
           <a:p>
             <a:fld id="{20AE39AD-C2FA-A54F-A200-EE4A7E7B5C00}" type="slidenum">
               <a:rPr lang="en-US" smtClean="0"/>
+              <a:pPr/>
               <a:t>‹#›</a:t>
             </a:fld>
             <a:endParaRPr lang="en-US"/>
@@ -1867,7 +1885,7 @@
     </p:spTree>
     <p:extLst>
       <p:ext uri="{BB962C8B-B14F-4D97-AF65-F5344CB8AC3E}">
-        <p14:creationId xmlns:p14="http://schemas.microsoft.com/office/powerpoint/2010/main" val="2128215051"/>
+        <p14:creationId xmlns:p14="http://schemas.microsoft.com/office/powerpoint/2010/main" xmlns="" val="2128215051"/>
       </p:ext>
     </p:extLst>
   </p:cSld>
@@ -2093,7 +2111,8 @@
           <a:p>
             <a:fld id="{BED1614E-28FD-C54C-811F-CB4EE2076F62}" type="datetimeFigureOut">
               <a:rPr lang="en-US" smtClean="0"/>
-              <a:t>1/27/17</a:t>
+              <a:pPr/>
+              <a:t>4/10/2017</a:t>
             </a:fld>
             <a:endParaRPr lang="en-US"/>
           </a:p>
@@ -2135,6 +2154,7 @@
           <a:p>
             <a:fld id="{20AE39AD-C2FA-A54F-A200-EE4A7E7B5C00}" type="slidenum">
               <a:rPr lang="en-US" smtClean="0"/>
+              <a:pPr/>
               <a:t>‹#›</a:t>
             </a:fld>
             <a:endParaRPr lang="en-US"/>
@@ -2144,7 +2164,7 @@
     </p:spTree>
     <p:extLst>
       <p:ext uri="{BB962C8B-B14F-4D97-AF65-F5344CB8AC3E}">
-        <p14:creationId xmlns:p14="http://schemas.microsoft.com/office/powerpoint/2010/main" val="422737725"/>
+        <p14:creationId xmlns:p14="http://schemas.microsoft.com/office/powerpoint/2010/main" xmlns="" val="422737725"/>
       </p:ext>
     </p:extLst>
   </p:cSld>
@@ -2346,7 +2366,8 @@
           <a:p>
             <a:fld id="{BED1614E-28FD-C54C-811F-CB4EE2076F62}" type="datetimeFigureOut">
               <a:rPr lang="en-US" smtClean="0"/>
-              <a:t>1/27/17</a:t>
+              <a:pPr/>
+              <a:t>4/10/2017</a:t>
             </a:fld>
             <a:endParaRPr lang="en-US"/>
           </a:p>
@@ -2388,6 +2409,7 @@
           <a:p>
             <a:fld id="{20AE39AD-C2FA-A54F-A200-EE4A7E7B5C00}" type="slidenum">
               <a:rPr lang="en-US" smtClean="0"/>
+              <a:pPr/>
               <a:t>‹#›</a:t>
             </a:fld>
             <a:endParaRPr lang="en-US"/>
@@ -2397,7 +2419,7 @@
     </p:spTree>
     <p:extLst>
       <p:ext uri="{BB962C8B-B14F-4D97-AF65-F5344CB8AC3E}">
-        <p14:creationId xmlns:p14="http://schemas.microsoft.com/office/powerpoint/2010/main" val="1077039799"/>
+        <p14:creationId xmlns:p14="http://schemas.microsoft.com/office/powerpoint/2010/main" xmlns="" val="1077039799"/>
       </p:ext>
     </p:extLst>
   </p:cSld>
@@ -2559,7 +2581,8 @@
           <a:p>
             <a:fld id="{BED1614E-28FD-C54C-811F-CB4EE2076F62}" type="datetimeFigureOut">
               <a:rPr lang="en-US" smtClean="0"/>
-              <a:t>1/27/17</a:t>
+              <a:pPr/>
+              <a:t>4/10/2017</a:t>
             </a:fld>
             <a:endParaRPr lang="en-US"/>
           </a:p>
@@ -2637,6 +2660,7 @@
           <a:p>
             <a:fld id="{20AE39AD-C2FA-A54F-A200-EE4A7E7B5C00}" type="slidenum">
               <a:rPr lang="en-US" smtClean="0"/>
+              <a:pPr/>
               <a:t>‹#›</a:t>
             </a:fld>
             <a:endParaRPr lang="en-US"/>
@@ -2646,7 +2670,7 @@
     </p:spTree>
     <p:extLst>
       <p:ext uri="{BB962C8B-B14F-4D97-AF65-F5344CB8AC3E}">
-        <p14:creationId xmlns:p14="http://schemas.microsoft.com/office/powerpoint/2010/main" val="1219577852"/>
+        <p14:creationId xmlns:p14="http://schemas.microsoft.com/office/powerpoint/2010/main" xmlns="" val="1219577852"/>
       </p:ext>
     </p:extLst>
   </p:cSld>
@@ -3020,7 +3044,7 @@
           <a:blip r:embed="rId2" cstate="print">
             <a:extLst>
               <a:ext uri="{28A0092B-C50C-407E-A947-70E740481C1C}">
-                <a14:useLocalDpi xmlns:a14="http://schemas.microsoft.com/office/drawing/2010/main"/>
+                <a14:useLocalDpi xmlns:a14="http://schemas.microsoft.com/office/drawing/2010/main" xmlns=""/>
               </a:ext>
             </a:extLst>
           </a:blip>
@@ -3043,7 +3067,7 @@
           </a:ln>
           <a:extLst>
             <a:ext uri="{FAA26D3D-D897-4be2-8F04-BA451C77F1D7}">
-              <ma14:placeholderFlag xmlns:ma14="http://schemas.microsoft.com/office/mac/drawingml/2011/main"/>
+              <ma14:placeholderFlag xmlns:ma14="http://schemas.microsoft.com/office/mac/drawingml/2011/main" xmlns=""/>
             </a:ext>
           </a:extLst>
         </p:spPr>
@@ -3194,8 +3218,8 @@
         </p:nvSpPr>
         <p:spPr>
           <a:xfrm>
-            <a:off x="5702740" y="3994726"/>
-            <a:ext cx="3001143" cy="646331"/>
+            <a:off x="5675490" y="3994726"/>
+            <a:ext cx="3028393" cy="646331"/>
           </a:xfrm>
           <a:prstGeom prst="rect">
             <a:avLst/>
@@ -3221,22 +3245,11 @@
                 <a:ea typeface="Tahoma" charset="0"/>
                 <a:cs typeface="Tahoma" charset="0"/>
               </a:rPr>
-              <a:t>DevOps: Cloud Native</a:t>
+              <a:t>Database Cloud Services</a:t>
             </a:r>
           </a:p>
           <a:p>
             <a:pPr algn="r"/>
-            <a:r>
-              <a:rPr lang="en-US" b="1" dirty="0" err="1" smtClean="0">
-                <a:solidFill>
-                  <a:schemeClr val="bg1"/>
-                </a:solidFill>
-                <a:latin typeface="Tahoma" charset="0"/>
-                <a:ea typeface="Tahoma" charset="0"/>
-                <a:cs typeface="Tahoma" charset="0"/>
-              </a:rPr>
-              <a:t>Microservices</a:t>
-            </a:r>
             <a:r>
               <a:rPr lang="en-US" b="1" dirty="0" smtClean="0">
                 <a:solidFill>
@@ -3246,7 +3259,18 @@
                 <a:ea typeface="Tahoma" charset="0"/>
                 <a:cs typeface="Tahoma" charset="0"/>
               </a:rPr>
-              <a:t> Workshop</a:t>
+              <a:t>Workshop </a:t>
+            </a:r>
+            <a:r>
+              <a:rPr lang="en-US" b="1" smtClean="0">
+                <a:solidFill>
+                  <a:schemeClr val="bg1"/>
+                </a:solidFill>
+                <a:latin typeface="Tahoma" charset="0"/>
+                <a:ea typeface="Tahoma" charset="0"/>
+                <a:cs typeface="Tahoma" charset="0"/>
+              </a:rPr>
+              <a:t>– In-Memory</a:t>
             </a:r>
             <a:endParaRPr lang="en-US" b="1" dirty="0">
               <a:solidFill>
@@ -3262,7 +3286,7 @@
     </p:spTree>
     <p:extLst>
       <p:ext uri="{BB962C8B-B14F-4D97-AF65-F5344CB8AC3E}">
-        <p14:creationId xmlns:p14="http://schemas.microsoft.com/office/powerpoint/2010/main" val="68740902"/>
+        <p14:creationId xmlns:p14="http://schemas.microsoft.com/office/powerpoint/2010/main" xmlns="" val="68740902"/>
       </p:ext>
     </p:extLst>
   </p:cSld>
@@ -3315,7 +3339,7 @@
     </a:clrScheme>
     <a:fontScheme name="Office">
       <a:majorFont>
-        <a:latin typeface="Calibri Light" panose="020F0302020204030204"/>
+        <a:latin typeface="Calibri Light"/>
         <a:ea typeface=""/>
         <a:cs typeface=""/>
         <a:font script="Jpan" typeface="Yu Gothic Light"/>
@@ -3350,7 +3374,7 @@
         <a:font script="Geor" typeface="Sylfaen"/>
       </a:majorFont>
       <a:minorFont>
-        <a:latin typeface="Calibri" panose="020F0502020204030204"/>
+        <a:latin typeface="Calibri"/>
         <a:ea typeface=""/>
         <a:cs typeface=""/>
         <a:font script="Jpan" typeface="Yu Gothic"/>
@@ -3527,7 +3551,7 @@
   <a:extraClrSchemeLst/>
   <a:extLst>
     <a:ext uri="{05A4C25C-085E-4340-85A3-A5531E510DB2}">
-      <thm15:themeFamily xmlns:thm15="http://schemas.microsoft.com/office/thememl/2012/main" name="Office Theme" id="{62F939B6-93AF-4DB8-9C6B-D6C7DFDC589F}" vid="{4A3C46E8-61CC-4603-A589-7422A47A8E4A}"/>
+      <thm15:themeFamily xmlns:thm15="http://schemas.microsoft.com/office/thememl/2012/main" xmlns="" name="Office Theme" id="{62F939B6-93AF-4DB8-9C6B-D6C7DFDC589F}" vid="{4A3C46E8-61CC-4603-A589-7422A47A8E4A}"/>
     </a:ext>
   </a:extLst>
 </a:theme>

</xml_diff>